<commit_message>
Small updates to the conceptual model and incorporated it into Section 1
</commit_message>
<xml_diff>
--- a/assets/conceptual-model-diagram.pptx
+++ b/assets/conceptual-model-diagram.pptx
@@ -104,6 +104,11 @@
       </a:defRPr>
     </a:lvl9pPr>
   </p:defaultTextStyle>
+  <p:extLst>
+    <p:ext uri="{EFAFB233-063F-42B5-8137-9DF3F51BA10A}">
+      <p15:sldGuideLst xmlns:p15="http://schemas.microsoft.com/office/powerpoint/2012/main"/>
+    </p:ext>
+  </p:extLst>
 </p:presentation>
 </file>
 
@@ -3690,13 +3695,6 @@
               <a:t>Component</a:t>
             </a:r>
           </a:p>
-          <a:p>
-            <a:pPr algn="ctr"/>
-            <a:r>
-              <a:rPr lang="en-US" sz="800" dirty="0"/>
-              <a:t>- Parameters</a:t>
-            </a:r>
-          </a:p>
         </p:txBody>
       </p:sp>
       <p:sp>
@@ -3842,13 +3840,6 @@
             <a:r>
               <a:rPr lang="en-US" dirty="0"/>
               <a:t>Traits</a:t>
-            </a:r>
-          </a:p>
-          <a:p>
-            <a:pPr algn="ctr"/>
-            <a:r>
-              <a:rPr lang="en-US" sz="800" dirty="0"/>
-              <a:t>- Required Parameters</a:t>
             </a:r>
           </a:p>
         </p:txBody>
@@ -4185,6 +4176,108 @@
                 </a:solidFill>
               </a:rPr>
               <a:t>- Application Scopes</a:t>
+            </a:r>
+          </a:p>
+          <a:p>
+            <a:pPr lvl="0"/>
+            <a:r>
+              <a:rPr lang="en-US" sz="800" dirty="0">
+                <a:solidFill>
+                  <a:prstClr val="white"/>
+                </a:solidFill>
+              </a:rPr>
+              <a:t>- Parameters</a:t>
+            </a:r>
+          </a:p>
+        </p:txBody>
+      </p:sp>
+      <p:sp>
+        <p:nvSpPr>
+          <p:cNvPr id="20" name="TextBox 19">
+            <a:extLst>
+              <a:ext uri="{FF2B5EF4-FFF2-40B4-BE49-F238E27FC236}">
+                <a16:creationId xmlns:a16="http://schemas.microsoft.com/office/drawing/2014/main" id="{A88DA36F-A0E6-499E-82B9-3639E3C49E5A}"/>
+              </a:ext>
+            </a:extLst>
+          </p:cNvPr>
+          <p:cNvSpPr txBox="1"/>
+          <p:nvPr/>
+        </p:nvSpPr>
+        <p:spPr>
+          <a:xfrm>
+            <a:off x="3469061" y="5520641"/>
+            <a:ext cx="873957" cy="338554"/>
+          </a:xfrm>
+          <a:prstGeom prst="rect">
+            <a:avLst/>
+          </a:prstGeom>
+          <a:noFill/>
+        </p:spPr>
+        <p:txBody>
+          <a:bodyPr wrap="none" rtlCol="0">
+            <a:spAutoFit/>
+          </a:bodyPr>
+          <a:lstStyle/>
+          <a:p>
+            <a:pPr lvl="0"/>
+            <a:r>
+              <a:rPr lang="en-US" sz="800" dirty="0">
+                <a:solidFill>
+                  <a:prstClr val="white"/>
+                </a:solidFill>
+              </a:rPr>
+              <a:t>- Workload Type</a:t>
+            </a:r>
+          </a:p>
+          <a:p>
+            <a:pPr lvl="0"/>
+            <a:r>
+              <a:rPr lang="en-US" sz="800" dirty="0">
+                <a:solidFill>
+                  <a:prstClr val="white"/>
+                </a:solidFill>
+              </a:rPr>
+              <a:t>- Parameters</a:t>
+            </a:r>
+          </a:p>
+        </p:txBody>
+      </p:sp>
+      <p:sp>
+        <p:nvSpPr>
+          <p:cNvPr id="23" name="TextBox 22">
+            <a:extLst>
+              <a:ext uri="{FF2B5EF4-FFF2-40B4-BE49-F238E27FC236}">
+                <a16:creationId xmlns:a16="http://schemas.microsoft.com/office/drawing/2014/main" id="{4F240C5B-5FFA-48FC-A10B-7619AE654B31}"/>
+              </a:ext>
+            </a:extLst>
+          </p:cNvPr>
+          <p:cNvSpPr txBox="1"/>
+          <p:nvPr/>
+        </p:nvSpPr>
+        <p:spPr>
+          <a:xfrm>
+            <a:off x="7589430" y="4800106"/>
+            <a:ext cx="720069" cy="338554"/>
+          </a:xfrm>
+          <a:prstGeom prst="rect">
+            <a:avLst/>
+          </a:prstGeom>
+          <a:noFill/>
+        </p:spPr>
+        <p:txBody>
+          <a:bodyPr wrap="none" rtlCol="0">
+            <a:spAutoFit/>
+          </a:bodyPr>
+          <a:lstStyle/>
+          <a:p>
+            <a:pPr lvl="0"/>
+            <a:r>
+              <a:rPr lang="en-US" sz="800" dirty="0">
+                <a:solidFill>
+                  <a:prstClr val="white"/>
+                </a:solidFill>
+              </a:rPr>
+              <a:t>- Trait Type</a:t>
             </a:r>
           </a:p>
           <a:p>

</xml_diff>